<commit_message>
Make PPT more robust
</commit_message>
<xml_diff>
--- a/PPT_Presentation/Class presentation.pptx
+++ b/PPT_Presentation/Class presentation.pptx
@@ -8,13 +8,17 @@
     <p:sldId id="256" r:id="rId2"/>
     <p:sldId id="263" r:id="rId3"/>
     <p:sldId id="258" r:id="rId4"/>
-    <p:sldId id="259" r:id="rId5"/>
-    <p:sldId id="260" r:id="rId6"/>
-    <p:sldId id="261" r:id="rId7"/>
-    <p:sldId id="262" r:id="rId8"/>
-    <p:sldId id="264" r:id="rId9"/>
-    <p:sldId id="265" r:id="rId10"/>
-    <p:sldId id="266" r:id="rId11"/>
+    <p:sldId id="270" r:id="rId5"/>
+    <p:sldId id="259" r:id="rId6"/>
+    <p:sldId id="268" r:id="rId7"/>
+    <p:sldId id="260" r:id="rId8"/>
+    <p:sldId id="261" r:id="rId9"/>
+    <p:sldId id="262" r:id="rId10"/>
+    <p:sldId id="264" r:id="rId11"/>
+    <p:sldId id="265" r:id="rId12"/>
+    <p:sldId id="269" r:id="rId13"/>
+    <p:sldId id="266" r:id="rId14"/>
+    <p:sldId id="267" r:id="rId15"/>
   </p:sldIdLst>
   <p:sldSz cx="9144000" cy="6858000" type="screen4x3"/>
   <p:notesSz cx="6858000" cy="9144000"/>
@@ -113,6 +117,11 @@
       </a:defRPr>
     </a:lvl9pPr>
   </p:defaultTextStyle>
+  <p:extLst>
+    <p:ext uri="{EFAFB233-063F-42B5-8137-9DF3F51BA10A}">
+      <p15:sldGuideLst xmlns:p15="http://schemas.microsoft.com/office/powerpoint/2012/main"/>
+    </p:ext>
+  </p:extLst>
 </p:presentation>
 </file>
 
@@ -255,7 +264,7 @@
           <a:p>
             <a:fld id="{F4DF3A0F-50F4-5F45-BEAE-3C57D1A4584B}" type="datetimeFigureOut">
               <a:rPr lang="en-US" smtClean="0"/>
-              <a:t>5/7/18</a:t>
+              <a:t>5/17/18</a:t>
             </a:fld>
             <a:endParaRPr lang="en-US"/>
           </a:p>
@@ -497,7 +506,7 @@
           <a:p>
             <a:fld id="{F4DF3A0F-50F4-5F45-BEAE-3C57D1A4584B}" type="datetimeFigureOut">
               <a:rPr lang="en-US" smtClean="0"/>
-              <a:t>5/7/18</a:t>
+              <a:t>5/17/18</a:t>
             </a:fld>
             <a:endParaRPr lang="en-US"/>
           </a:p>
@@ -681,7 +690,7 @@
           <a:p>
             <a:fld id="{F4DF3A0F-50F4-5F45-BEAE-3C57D1A4584B}" type="datetimeFigureOut">
               <a:rPr lang="en-US" smtClean="0"/>
-              <a:t>5/7/18</a:t>
+              <a:t>5/17/18</a:t>
             </a:fld>
             <a:endParaRPr lang="en-US"/>
           </a:p>
@@ -882,7 +891,7 @@
           <a:p>
             <a:fld id="{F4DF3A0F-50F4-5F45-BEAE-3C57D1A4584B}" type="datetimeFigureOut">
               <a:rPr lang="en-US" smtClean="0"/>
-              <a:t>5/7/18</a:t>
+              <a:t>5/17/18</a:t>
             </a:fld>
             <a:endParaRPr lang="en-US"/>
           </a:p>
@@ -1161,7 +1170,7 @@
           <a:p>
             <a:fld id="{F4DF3A0F-50F4-5F45-BEAE-3C57D1A4584B}" type="datetimeFigureOut">
               <a:rPr lang="en-US" smtClean="0"/>
-              <a:t>5/7/18</a:t>
+              <a:t>5/17/18</a:t>
             </a:fld>
             <a:endParaRPr lang="en-US"/>
           </a:p>
@@ -1429,7 +1438,7 @@
           <a:p>
             <a:fld id="{F4DF3A0F-50F4-5F45-BEAE-3C57D1A4584B}" type="datetimeFigureOut">
               <a:rPr lang="en-US" smtClean="0"/>
-              <a:t>5/7/18</a:t>
+              <a:t>5/17/18</a:t>
             </a:fld>
             <a:endParaRPr lang="en-US"/>
           </a:p>
@@ -1876,7 +1885,7 @@
           <a:p>
             <a:fld id="{F4DF3A0F-50F4-5F45-BEAE-3C57D1A4584B}" type="datetimeFigureOut">
               <a:rPr lang="en-US" smtClean="0"/>
-              <a:t>5/7/18</a:t>
+              <a:t>5/17/18</a:t>
             </a:fld>
             <a:endParaRPr lang="en-US"/>
           </a:p>
@@ -2025,7 +2034,7 @@
           <a:p>
             <a:fld id="{F4DF3A0F-50F4-5F45-BEAE-3C57D1A4584B}" type="datetimeFigureOut">
               <a:rPr lang="en-US" smtClean="0"/>
-              <a:t>5/7/18</a:t>
+              <a:t>5/17/18</a:t>
             </a:fld>
             <a:endParaRPr lang="en-US"/>
           </a:p>
@@ -2120,7 +2129,7 @@
           <a:p>
             <a:fld id="{F4DF3A0F-50F4-5F45-BEAE-3C57D1A4584B}" type="datetimeFigureOut">
               <a:rPr lang="en-US" smtClean="0"/>
-              <a:t>5/7/18</a:t>
+              <a:t>5/17/18</a:t>
             </a:fld>
             <a:endParaRPr lang="en-US"/>
           </a:p>
@@ -2373,7 +2382,7 @@
           <a:p>
             <a:fld id="{F4DF3A0F-50F4-5F45-BEAE-3C57D1A4584B}" type="datetimeFigureOut">
               <a:rPr lang="en-US" smtClean="0"/>
-              <a:t>5/7/18</a:t>
+              <a:t>5/17/18</a:t>
             </a:fld>
             <a:endParaRPr lang="en-US"/>
           </a:p>
@@ -2818,7 +2827,7 @@
           <a:p>
             <a:fld id="{F4DF3A0F-50F4-5F45-BEAE-3C57D1A4584B}" type="datetimeFigureOut">
               <a:rPr lang="en-US" smtClean="0"/>
-              <a:t>5/7/18</a:t>
+              <a:t>5/17/18</a:t>
             </a:fld>
             <a:endParaRPr lang="en-US"/>
           </a:p>
@@ -3181,7 +3190,7 @@
           <a:p>
             <a:fld id="{F4DF3A0F-50F4-5F45-BEAE-3C57D1A4584B}" type="datetimeFigureOut">
               <a:rPr lang="en-US" smtClean="0"/>
-              <a:t>5/7/18</a:t>
+              <a:t>5/17/18</a:t>
             </a:fld>
             <a:endParaRPr lang="en-US"/>
           </a:p>
@@ -3825,6 +3834,306 @@
           <p:cNvPr id="2" name="Title 1">
             <a:extLst>
               <a:ext uri="{FF2B5EF4-FFF2-40B4-BE49-F238E27FC236}">
+                <a16:creationId xmlns:a16="http://schemas.microsoft.com/office/drawing/2014/main" id="{12436357-E561-4A43-B321-6A8CA7543CDD}"/>
+              </a:ext>
+            </a:extLst>
+          </p:cNvPr>
+          <p:cNvSpPr>
+            <a:spLocks noGrp="1"/>
+          </p:cNvSpPr>
+          <p:nvPr>
+            <p:ph type="title"/>
+          </p:nvPr>
+        </p:nvSpPr>
+        <p:spPr/>
+        <p:txBody>
+          <a:bodyPr/>
+          <a:lstStyle/>
+          <a:p>
+            <a:r>
+              <a:rPr lang="en-US" dirty="0"/>
+              <a:t>Data Cleaning</a:t>
+            </a:r>
+          </a:p>
+        </p:txBody>
+      </p:sp>
+      <p:sp>
+        <p:nvSpPr>
+          <p:cNvPr id="3" name="Content Placeholder 2">
+            <a:extLst>
+              <a:ext uri="{FF2B5EF4-FFF2-40B4-BE49-F238E27FC236}">
+                <a16:creationId xmlns:a16="http://schemas.microsoft.com/office/drawing/2014/main" id="{665401A9-59E2-1948-A0E2-0A83327B168A}"/>
+              </a:ext>
+            </a:extLst>
+          </p:cNvPr>
+          <p:cNvSpPr>
+            <a:spLocks noGrp="1"/>
+          </p:cNvSpPr>
+          <p:nvPr>
+            <p:ph idx="1"/>
+          </p:nvPr>
+        </p:nvSpPr>
+        <p:spPr/>
+        <p:txBody>
+          <a:bodyPr/>
+          <a:lstStyle/>
+          <a:p>
+            <a:r>
+              <a:rPr lang="en-US" dirty="0"/>
+              <a:t>Notes field mined for useful information that could clear up ambiguous answers</a:t>
+            </a:r>
+          </a:p>
+          <a:p>
+            <a:r>
+              <a:rPr lang="en-US" dirty="0"/>
+              <a:t>Gender field consolidated into M/F/Other</a:t>
+            </a:r>
+          </a:p>
+          <a:p>
+            <a:r>
+              <a:rPr lang="en-US" dirty="0"/>
+              <a:t>Removal of unhelpful / sparse questions like U.S. State</a:t>
+            </a:r>
+          </a:p>
+          <a:p>
+            <a:endParaRPr lang="en-US" dirty="0"/>
+          </a:p>
+        </p:txBody>
+      </p:sp>
+    </p:spTree>
+    <p:extLst>
+      <p:ext uri="{BB962C8B-B14F-4D97-AF65-F5344CB8AC3E}">
+        <p14:creationId xmlns:p14="http://schemas.microsoft.com/office/powerpoint/2010/main" val="1336197372"/>
+      </p:ext>
+    </p:extLst>
+  </p:cSld>
+  <p:clrMapOvr>
+    <a:masterClrMapping/>
+  </p:clrMapOvr>
+</p:sld>
+</file>
+
+<file path=ppt/slides/slide11.xml><?xml version="1.0" encoding="utf-8"?>
+<p:sld xmlns:a="http://schemas.openxmlformats.org/drawingml/2006/main" xmlns:r="http://schemas.openxmlformats.org/officeDocument/2006/relationships" xmlns:p="http://schemas.openxmlformats.org/presentationml/2006/main">
+  <p:cSld>
+    <p:spTree>
+      <p:nvGrpSpPr>
+        <p:cNvPr id="1" name=""/>
+        <p:cNvGrpSpPr/>
+        <p:nvPr/>
+      </p:nvGrpSpPr>
+      <p:grpSpPr>
+        <a:xfrm>
+          <a:off x="0" y="0"/>
+          <a:ext cx="0" cy="0"/>
+          <a:chOff x="0" y="0"/>
+          <a:chExt cx="0" cy="0"/>
+        </a:xfrm>
+      </p:grpSpPr>
+      <p:sp>
+        <p:nvSpPr>
+          <p:cNvPr id="2" name="Title 1">
+            <a:extLst>
+              <a:ext uri="{FF2B5EF4-FFF2-40B4-BE49-F238E27FC236}">
+                <a16:creationId xmlns:a16="http://schemas.microsoft.com/office/drawing/2014/main" id="{63258A90-013C-7741-90B5-D4AA7821165F}"/>
+              </a:ext>
+            </a:extLst>
+          </p:cNvPr>
+          <p:cNvSpPr>
+            <a:spLocks noGrp="1"/>
+          </p:cNvSpPr>
+          <p:nvPr>
+            <p:ph type="title"/>
+          </p:nvPr>
+        </p:nvSpPr>
+        <p:spPr/>
+        <p:txBody>
+          <a:bodyPr/>
+          <a:lstStyle/>
+          <a:p>
+            <a:r>
+              <a:rPr lang="en-US" dirty="0"/>
+              <a:t>Analytics Approach</a:t>
+            </a:r>
+          </a:p>
+        </p:txBody>
+      </p:sp>
+      <p:sp>
+        <p:nvSpPr>
+          <p:cNvPr id="3" name="Content Placeholder 2">
+            <a:extLst>
+              <a:ext uri="{FF2B5EF4-FFF2-40B4-BE49-F238E27FC236}">
+                <a16:creationId xmlns:a16="http://schemas.microsoft.com/office/drawing/2014/main" id="{6ED31153-0D20-C944-8956-664E5E59D495}"/>
+              </a:ext>
+            </a:extLst>
+          </p:cNvPr>
+          <p:cNvSpPr>
+            <a:spLocks noGrp="1"/>
+          </p:cNvSpPr>
+          <p:nvPr>
+            <p:ph idx="1"/>
+          </p:nvPr>
+        </p:nvSpPr>
+        <p:spPr/>
+        <p:txBody>
+          <a:bodyPr>
+            <a:normAutofit fontScale="92500"/>
+          </a:bodyPr>
+          <a:lstStyle/>
+          <a:p>
+            <a:r>
+              <a:rPr lang="en-US" dirty="0"/>
+              <a:t>Aim: model seeking professional mental health services as the dependent variable based on responses to other questions</a:t>
+            </a:r>
+          </a:p>
+          <a:p>
+            <a:r>
+              <a:rPr lang="en-US" dirty="0"/>
+              <a:t>Logistic regression using logit</a:t>
+            </a:r>
+          </a:p>
+          <a:p>
+            <a:r>
+              <a:rPr lang="en-US" dirty="0"/>
+              <a:t>Three models, of increasingly constrained feature sets, all with AUC above 0.89</a:t>
+            </a:r>
+          </a:p>
+          <a:p>
+            <a:r>
+              <a:rPr lang="en-US" dirty="0"/>
+              <a:t>A balanced model with 8 predictors and AUC of 0.91 explains nearly half the variance in whether help is sought from professional mental health services.</a:t>
+            </a:r>
+          </a:p>
+          <a:p>
+            <a:endParaRPr lang="en-US" dirty="0"/>
+          </a:p>
+          <a:p>
+            <a:endParaRPr lang="en-US" dirty="0"/>
+          </a:p>
+        </p:txBody>
+      </p:sp>
+    </p:spTree>
+    <p:extLst>
+      <p:ext uri="{BB962C8B-B14F-4D97-AF65-F5344CB8AC3E}">
+        <p14:creationId xmlns:p14="http://schemas.microsoft.com/office/powerpoint/2010/main" val="378776476"/>
+      </p:ext>
+    </p:extLst>
+  </p:cSld>
+  <p:clrMapOvr>
+    <a:masterClrMapping/>
+  </p:clrMapOvr>
+</p:sld>
+</file>
+
+<file path=ppt/slides/slide12.xml><?xml version="1.0" encoding="utf-8"?>
+<p:sld xmlns:a="http://schemas.openxmlformats.org/drawingml/2006/main" xmlns:r="http://schemas.openxmlformats.org/officeDocument/2006/relationships" xmlns:p="http://schemas.openxmlformats.org/presentationml/2006/main">
+  <p:cSld>
+    <p:spTree>
+      <p:nvGrpSpPr>
+        <p:cNvPr id="1" name=""/>
+        <p:cNvGrpSpPr/>
+        <p:nvPr/>
+      </p:nvGrpSpPr>
+      <p:grpSpPr>
+        <a:xfrm>
+          <a:off x="0" y="0"/>
+          <a:ext cx="0" cy="0"/>
+          <a:chOff x="0" y="0"/>
+          <a:chExt cx="0" cy="0"/>
+        </a:xfrm>
+      </p:grpSpPr>
+      <p:sp>
+        <p:nvSpPr>
+          <p:cNvPr id="2" name="Title 1">
+            <a:extLst>
+              <a:ext uri="{FF2B5EF4-FFF2-40B4-BE49-F238E27FC236}">
+                <a16:creationId xmlns:a16="http://schemas.microsoft.com/office/drawing/2014/main" id="{87200383-1754-7D46-8C4E-AB4C126E2FAA}"/>
+              </a:ext>
+            </a:extLst>
+          </p:cNvPr>
+          <p:cNvSpPr>
+            <a:spLocks noGrp="1"/>
+          </p:cNvSpPr>
+          <p:nvPr>
+            <p:ph type="title"/>
+          </p:nvPr>
+        </p:nvSpPr>
+        <p:spPr/>
+        <p:txBody>
+          <a:bodyPr/>
+          <a:lstStyle/>
+          <a:p>
+            <a:r>
+              <a:rPr lang="en-US" dirty="0"/>
+              <a:t>SELECTED MODEL</a:t>
+            </a:r>
+          </a:p>
+        </p:txBody>
+      </p:sp>
+      <p:pic>
+        <p:nvPicPr>
+          <p:cNvPr id="5" name="Content Placeholder 4">
+            <a:extLst>
+              <a:ext uri="{FF2B5EF4-FFF2-40B4-BE49-F238E27FC236}">
+                <a16:creationId xmlns:a16="http://schemas.microsoft.com/office/drawing/2014/main" id="{83BF1844-C704-D84C-BAE5-2614F5122D80}"/>
+              </a:ext>
+            </a:extLst>
+          </p:cNvPr>
+          <p:cNvPicPr>
+            <a:picLocks noGrp="1" noChangeAspect="1"/>
+          </p:cNvPicPr>
+          <p:nvPr>
+            <p:ph idx="1"/>
+          </p:nvPr>
+        </p:nvPicPr>
+        <p:blipFill>
+          <a:blip r:embed="rId2"/>
+          <a:stretch>
+            <a:fillRect/>
+          </a:stretch>
+        </p:blipFill>
+        <p:spPr>
+          <a:xfrm>
+            <a:off x="2079822" y="2016124"/>
+            <a:ext cx="5298680" cy="3940535"/>
+          </a:xfrm>
+        </p:spPr>
+      </p:pic>
+    </p:spTree>
+    <p:extLst>
+      <p:ext uri="{BB962C8B-B14F-4D97-AF65-F5344CB8AC3E}">
+        <p14:creationId xmlns:p14="http://schemas.microsoft.com/office/powerpoint/2010/main" val="1285286292"/>
+      </p:ext>
+    </p:extLst>
+  </p:cSld>
+  <p:clrMapOvr>
+    <a:masterClrMapping/>
+  </p:clrMapOvr>
+</p:sld>
+</file>
+
+<file path=ppt/slides/slide13.xml><?xml version="1.0" encoding="utf-8"?>
+<p:sld xmlns:a="http://schemas.openxmlformats.org/drawingml/2006/main" xmlns:r="http://schemas.openxmlformats.org/officeDocument/2006/relationships" xmlns:p="http://schemas.openxmlformats.org/presentationml/2006/main">
+  <p:cSld>
+    <p:spTree>
+      <p:nvGrpSpPr>
+        <p:cNvPr id="1" name=""/>
+        <p:cNvGrpSpPr/>
+        <p:nvPr/>
+      </p:nvGrpSpPr>
+      <p:grpSpPr>
+        <a:xfrm>
+          <a:off x="0" y="0"/>
+          <a:ext cx="0" cy="0"/>
+          <a:chOff x="0" y="0"/>
+          <a:chExt cx="0" cy="0"/>
+        </a:xfrm>
+      </p:grpSpPr>
+      <p:sp>
+        <p:nvSpPr>
+          <p:cNvPr id="2" name="Title 1">
+            <a:extLst>
+              <a:ext uri="{FF2B5EF4-FFF2-40B4-BE49-F238E27FC236}">
                 <a16:creationId xmlns:a16="http://schemas.microsoft.com/office/drawing/2014/main" id="{F0711551-9E6F-F94D-A8C9-4BA4AAC48638}"/>
               </a:ext>
             </a:extLst>
@@ -3864,16 +4173,21 @@
             <p:ph idx="1"/>
           </p:nvPr>
         </p:nvSpPr>
-        <p:spPr/>
+        <p:spPr>
+          <a:xfrm>
+            <a:off x="1443491" y="2015733"/>
+            <a:ext cx="6571343" cy="3854489"/>
+          </a:xfrm>
+        </p:spPr>
         <p:txBody>
           <a:bodyPr>
-            <a:normAutofit fontScale="92500" lnSpcReduction="10000"/>
+            <a:normAutofit lnSpcReduction="10000"/>
           </a:bodyPr>
           <a:lstStyle/>
           <a:p>
             <a:r>
               <a:rPr lang="en-US" dirty="0"/>
-              <a:t>Highly predictive variables within a company’s control that encourage the treatment of mental health include</a:t>
+              <a:t>Predictive variables within a company’s control that encourage the treatment of mental health include</a:t>
             </a:r>
           </a:p>
           <a:p>
@@ -3900,7 +4214,7 @@
           <a:p>
             <a:r>
               <a:rPr lang="en-US" dirty="0"/>
-              <a:t>Highly predictive variable about the employee’s self-evaluation that encourages the treatment of mental health</a:t>
+              <a:t>Predictive variable about the employee’s self-evaluation that encourages the treatment of mental health</a:t>
             </a:r>
           </a:p>
           <a:p>
@@ -3916,6 +4230,102 @@
     <p:extLst>
       <p:ext uri="{BB962C8B-B14F-4D97-AF65-F5344CB8AC3E}">
         <p14:creationId xmlns:p14="http://schemas.microsoft.com/office/powerpoint/2010/main" val="1508825166"/>
+      </p:ext>
+    </p:extLst>
+  </p:cSld>
+  <p:clrMapOvr>
+    <a:masterClrMapping/>
+  </p:clrMapOvr>
+</p:sld>
+</file>
+
+<file path=ppt/slides/slide14.xml><?xml version="1.0" encoding="utf-8"?>
+<p:sld xmlns:a="http://schemas.openxmlformats.org/drawingml/2006/main" xmlns:r="http://schemas.openxmlformats.org/officeDocument/2006/relationships" xmlns:p="http://schemas.openxmlformats.org/presentationml/2006/main">
+  <p:cSld>
+    <p:spTree>
+      <p:nvGrpSpPr>
+        <p:cNvPr id="1" name=""/>
+        <p:cNvGrpSpPr/>
+        <p:nvPr/>
+      </p:nvGrpSpPr>
+      <p:grpSpPr>
+        <a:xfrm>
+          <a:off x="0" y="0"/>
+          <a:ext cx="0" cy="0"/>
+          <a:chOff x="0" y="0"/>
+          <a:chExt cx="0" cy="0"/>
+        </a:xfrm>
+      </p:grpSpPr>
+      <p:sp>
+        <p:nvSpPr>
+          <p:cNvPr id="2" name="Title 1">
+            <a:extLst>
+              <a:ext uri="{FF2B5EF4-FFF2-40B4-BE49-F238E27FC236}">
+                <a16:creationId xmlns:a16="http://schemas.microsoft.com/office/drawing/2014/main" id="{FED4F550-0D99-D24D-83B5-4B919E57A5C9}"/>
+              </a:ext>
+            </a:extLst>
+          </p:cNvPr>
+          <p:cNvSpPr>
+            <a:spLocks noGrp="1"/>
+          </p:cNvSpPr>
+          <p:nvPr>
+            <p:ph type="title"/>
+          </p:nvPr>
+        </p:nvSpPr>
+        <p:spPr/>
+        <p:txBody>
+          <a:bodyPr/>
+          <a:lstStyle/>
+          <a:p>
+            <a:r>
+              <a:rPr lang="en-US" dirty="0"/>
+              <a:t>Participate!</a:t>
+            </a:r>
+          </a:p>
+        </p:txBody>
+      </p:sp>
+      <p:sp>
+        <p:nvSpPr>
+          <p:cNvPr id="3" name="Content Placeholder 2">
+            <a:extLst>
+              <a:ext uri="{FF2B5EF4-FFF2-40B4-BE49-F238E27FC236}">
+                <a16:creationId xmlns:a16="http://schemas.microsoft.com/office/drawing/2014/main" id="{76663CFE-573B-8C4C-9691-F7D02C29ACF7}"/>
+              </a:ext>
+            </a:extLst>
+          </p:cNvPr>
+          <p:cNvSpPr>
+            <a:spLocks noGrp="1"/>
+          </p:cNvSpPr>
+          <p:nvPr>
+            <p:ph idx="1"/>
+          </p:nvPr>
+        </p:nvSpPr>
+        <p:spPr/>
+        <p:txBody>
+          <a:bodyPr/>
+          <a:lstStyle/>
+          <a:p>
+            <a:r>
+              <a:rPr lang="en-US" dirty="0"/>
+              <a:t>To join in the data gathering for the next round of OSMI research, please visit </a:t>
+            </a:r>
+            <a:r>
+              <a:rPr lang="en-US" dirty="0">
+                <a:hlinkClick r:id="rId2"/>
+              </a:rPr>
+              <a:t>https://osmi.typeform.com/to/XYupsC</a:t>
+            </a:r>
+            <a:r>
+              <a:rPr lang="en-US" dirty="0"/>
+              <a:t>.</a:t>
+            </a:r>
+          </a:p>
+        </p:txBody>
+      </p:sp>
+    </p:spTree>
+    <p:extLst>
+      <p:ext uri="{BB962C8B-B14F-4D97-AF65-F5344CB8AC3E}">
+        <p14:creationId xmlns:p14="http://schemas.microsoft.com/office/powerpoint/2010/main" val="320031867"/>
       </p:ext>
     </p:extLst>
   </p:cSld>
@@ -4151,6 +4561,93 @@
 </file>
 
 <file path=ppt/slides/slide4.xml><?xml version="1.0" encoding="utf-8"?>
+<p:sld xmlns:a="http://schemas.openxmlformats.org/drawingml/2006/main" xmlns:r="http://schemas.openxmlformats.org/officeDocument/2006/relationships" xmlns:p="http://schemas.openxmlformats.org/presentationml/2006/main">
+  <p:cSld>
+    <p:spTree>
+      <p:nvGrpSpPr>
+        <p:cNvPr id="1" name=""/>
+        <p:cNvGrpSpPr/>
+        <p:nvPr/>
+      </p:nvGrpSpPr>
+      <p:grpSpPr>
+        <a:xfrm>
+          <a:off x="0" y="0"/>
+          <a:ext cx="0" cy="0"/>
+          <a:chOff x="0" y="0"/>
+          <a:chExt cx="0" cy="0"/>
+        </a:xfrm>
+      </p:grpSpPr>
+      <p:sp>
+        <p:nvSpPr>
+          <p:cNvPr id="2" name="Title 1">
+            <a:extLst>
+              <a:ext uri="{FF2B5EF4-FFF2-40B4-BE49-F238E27FC236}">
+                <a16:creationId xmlns:a16="http://schemas.microsoft.com/office/drawing/2014/main" id="{67EBE6A6-D90A-EE44-A9D1-CAC3654DA415}"/>
+              </a:ext>
+            </a:extLst>
+          </p:cNvPr>
+          <p:cNvSpPr>
+            <a:spLocks noGrp="1"/>
+          </p:cNvSpPr>
+          <p:nvPr>
+            <p:ph type="title"/>
+          </p:nvPr>
+        </p:nvSpPr>
+        <p:spPr/>
+        <p:txBody>
+          <a:bodyPr/>
+          <a:lstStyle/>
+          <a:p>
+            <a:r>
+              <a:rPr lang="en-US" dirty="0"/>
+              <a:t>Motivations</a:t>
+            </a:r>
+          </a:p>
+        </p:txBody>
+      </p:sp>
+      <p:pic>
+        <p:nvPicPr>
+          <p:cNvPr id="6" name="Content Placeholder 5">
+            <a:extLst>
+              <a:ext uri="{FF2B5EF4-FFF2-40B4-BE49-F238E27FC236}">
+                <a16:creationId xmlns:a16="http://schemas.microsoft.com/office/drawing/2014/main" id="{27E43ADA-C5C5-9245-BCEF-230321F868D3}"/>
+              </a:ext>
+            </a:extLst>
+          </p:cNvPr>
+          <p:cNvPicPr>
+            <a:picLocks noGrp="1" noChangeAspect="1"/>
+          </p:cNvPicPr>
+          <p:nvPr>
+            <p:ph idx="1"/>
+          </p:nvPr>
+        </p:nvPicPr>
+        <p:blipFill>
+          <a:blip r:embed="rId2"/>
+          <a:stretch>
+            <a:fillRect/>
+          </a:stretch>
+        </p:blipFill>
+        <p:spPr>
+          <a:xfrm>
+            <a:off x="1443038" y="2118448"/>
+            <a:ext cx="6572250" cy="3244991"/>
+          </a:xfrm>
+        </p:spPr>
+      </p:pic>
+    </p:spTree>
+    <p:extLst>
+      <p:ext uri="{BB962C8B-B14F-4D97-AF65-F5344CB8AC3E}">
+        <p14:creationId xmlns:p14="http://schemas.microsoft.com/office/powerpoint/2010/main" val="1014916699"/>
+      </p:ext>
+    </p:extLst>
+  </p:cSld>
+  <p:clrMapOvr>
+    <a:masterClrMapping/>
+  </p:clrMapOvr>
+</p:sld>
+</file>
+
+<file path=ppt/slides/slide5.xml><?xml version="1.0" encoding="utf-8"?>
 <p:sld xmlns:a="http://schemas.openxmlformats.org/drawingml/2006/main" xmlns:r="http://schemas.openxmlformats.org/officeDocument/2006/relationships" xmlns:p="http://schemas.openxmlformats.org/presentationml/2006/main">
   <p:cSld>
     <p:spTree>
@@ -4280,125 +4777,6 @@
 </p:sld>
 </file>
 
-<file path=ppt/slides/slide5.xml><?xml version="1.0" encoding="utf-8"?>
-<p:sld xmlns:a="http://schemas.openxmlformats.org/drawingml/2006/main" xmlns:r="http://schemas.openxmlformats.org/officeDocument/2006/relationships" xmlns:p="http://schemas.openxmlformats.org/presentationml/2006/main">
-  <p:cSld>
-    <p:spTree>
-      <p:nvGrpSpPr>
-        <p:cNvPr id="1" name=""/>
-        <p:cNvGrpSpPr/>
-        <p:nvPr/>
-      </p:nvGrpSpPr>
-      <p:grpSpPr>
-        <a:xfrm>
-          <a:off x="0" y="0"/>
-          <a:ext cx="0" cy="0"/>
-          <a:chOff x="0" y="0"/>
-          <a:chExt cx="0" cy="0"/>
-        </a:xfrm>
-      </p:grpSpPr>
-      <p:sp>
-        <p:nvSpPr>
-          <p:cNvPr id="2" name="Title 1">
-            <a:extLst>
-              <a:ext uri="{FF2B5EF4-FFF2-40B4-BE49-F238E27FC236}">
-                <a16:creationId xmlns:a16="http://schemas.microsoft.com/office/drawing/2014/main" id="{47C1BD56-7A71-FC40-B3C5-C3859FD8E483}"/>
-              </a:ext>
-            </a:extLst>
-          </p:cNvPr>
-          <p:cNvSpPr>
-            <a:spLocks noGrp="1"/>
-          </p:cNvSpPr>
-          <p:nvPr>
-            <p:ph type="title"/>
-          </p:nvPr>
-        </p:nvSpPr>
-        <p:spPr/>
-        <p:txBody>
-          <a:bodyPr/>
-          <a:lstStyle/>
-          <a:p>
-            <a:r>
-              <a:rPr lang="en-US" dirty="0"/>
-              <a:t>OSMI Data</a:t>
-            </a:r>
-          </a:p>
-        </p:txBody>
-      </p:sp>
-      <p:sp>
-        <p:nvSpPr>
-          <p:cNvPr id="3" name="Content Placeholder 2">
-            <a:extLst>
-              <a:ext uri="{FF2B5EF4-FFF2-40B4-BE49-F238E27FC236}">
-                <a16:creationId xmlns:a16="http://schemas.microsoft.com/office/drawing/2014/main" id="{E0CD9789-0FD6-8144-876D-BEC5B95F850E}"/>
-              </a:ext>
-            </a:extLst>
-          </p:cNvPr>
-          <p:cNvSpPr>
-            <a:spLocks noGrp="1"/>
-          </p:cNvSpPr>
-          <p:nvPr>
-            <p:ph idx="1"/>
-          </p:nvPr>
-        </p:nvSpPr>
-        <p:spPr/>
-        <p:txBody>
-          <a:bodyPr/>
-          <a:lstStyle/>
-          <a:p>
-            <a:r>
-              <a:rPr lang="en-US" dirty="0"/>
-              <a:t>Open Sourcing Mental Illness (OSMI) offered its mental health survey in 2014, 2016, and 2017.  </a:t>
-            </a:r>
-          </a:p>
-          <a:p>
-            <a:r>
-              <a:rPr lang="en-US" dirty="0"/>
-              <a:t>Data is available for 2014 and 2016.</a:t>
-            </a:r>
-          </a:p>
-          <a:p>
-            <a:r>
-              <a:rPr lang="en-US" dirty="0"/>
-              <a:t>We used 2016 data, licensed under Attribution-</a:t>
-            </a:r>
-            <a:r>
-              <a:rPr lang="en-US" dirty="0" err="1"/>
-              <a:t>ShareAlike</a:t>
-            </a:r>
-            <a:r>
-              <a:rPr lang="en-US" dirty="0"/>
-              <a:t> 4.0 International (CC BY-SA 4.0).  Therefore our findings here are shared under the same license.  For more information please see </a:t>
-            </a:r>
-            <a:r>
-              <a:rPr lang="en-US" dirty="0">
-                <a:hlinkClick r:id="rId2"/>
-              </a:rPr>
-              <a:t>https://creativecommons.org/licenses/by-sa/4.0/</a:t>
-            </a:r>
-            <a:r>
-              <a:rPr lang="en-US" dirty="0"/>
-              <a:t> </a:t>
-            </a:r>
-          </a:p>
-          <a:p>
-            <a:endParaRPr lang="en-US" dirty="0"/>
-          </a:p>
-        </p:txBody>
-      </p:sp>
-    </p:spTree>
-    <p:extLst>
-      <p:ext uri="{BB962C8B-B14F-4D97-AF65-F5344CB8AC3E}">
-        <p14:creationId xmlns:p14="http://schemas.microsoft.com/office/powerpoint/2010/main" val="2734839023"/>
-      </p:ext>
-    </p:extLst>
-  </p:cSld>
-  <p:clrMapOvr>
-    <a:masterClrMapping/>
-  </p:clrMapOvr>
-</p:sld>
-</file>
-
 <file path=ppt/slides/slide6.xml><?xml version="1.0" encoding="utf-8"?>
 <p:sld xmlns:a="http://schemas.openxmlformats.org/drawingml/2006/main" xmlns:r="http://schemas.openxmlformats.org/officeDocument/2006/relationships" xmlns:p="http://schemas.openxmlformats.org/presentationml/2006/main">
   <p:cSld>
@@ -4421,7 +4799,7 @@
           <p:cNvPr id="2" name="Title 1">
             <a:extLst>
               <a:ext uri="{FF2B5EF4-FFF2-40B4-BE49-F238E27FC236}">
-                <a16:creationId xmlns:a16="http://schemas.microsoft.com/office/drawing/2014/main" id="{C56753B4-0999-2347-AE36-6FFE12A99312}"/>
+                <a16:creationId xmlns:a16="http://schemas.microsoft.com/office/drawing/2014/main" id="{EF08C681-6FFC-D148-9B72-B31291339657}"/>
               </a:ext>
             </a:extLst>
           </p:cNvPr>
@@ -4439,63 +4817,44 @@
           <a:p>
             <a:r>
               <a:rPr lang="en-US" dirty="0"/>
-              <a:t>OSMI Data</a:t>
-            </a:r>
-          </a:p>
-        </p:txBody>
-      </p:sp>
-      <p:sp>
-        <p:nvSpPr>
-          <p:cNvPr id="3" name="Content Placeholder 2">
+              <a:t>Open Sourcing Mental Illness</a:t>
+            </a:r>
+          </a:p>
+        </p:txBody>
+      </p:sp>
+      <p:pic>
+        <p:nvPicPr>
+          <p:cNvPr id="5" name="Content Placeholder 4">
             <a:extLst>
               <a:ext uri="{FF2B5EF4-FFF2-40B4-BE49-F238E27FC236}">
-                <a16:creationId xmlns:a16="http://schemas.microsoft.com/office/drawing/2014/main" id="{12A79409-2B00-6A45-BBEA-0495AF144A73}"/>
+                <a16:creationId xmlns:a16="http://schemas.microsoft.com/office/drawing/2014/main" id="{7B825AF0-2645-A24D-9BA5-C6317528BFF4}"/>
               </a:ext>
             </a:extLst>
           </p:cNvPr>
-          <p:cNvSpPr>
-            <a:spLocks noGrp="1"/>
-          </p:cNvSpPr>
+          <p:cNvPicPr>
+            <a:picLocks noGrp="1" noChangeAspect="1"/>
+          </p:cNvPicPr>
           <p:nvPr>
             <p:ph idx="1"/>
           </p:nvPr>
-        </p:nvSpPr>
-        <p:spPr/>
-        <p:txBody>
-          <a:bodyPr>
-            <a:normAutofit fontScale="92500" lnSpcReduction="20000"/>
-          </a:bodyPr>
-          <a:lstStyle/>
-          <a:p>
-            <a:r>
-              <a:rPr lang="en-US" dirty="0"/>
-              <a:t>Survey data is collected anonymously, with no identifying information (no IRB / Ethics oversight required).</a:t>
-            </a:r>
-          </a:p>
-          <a:p>
-            <a:r>
-              <a:rPr lang="en-US" dirty="0"/>
-              <a:t>Some questions are posed about the person answering the survey, such as “What is your gender?”, “Do you work remotely?”, “Do you have a family history of mental illness?”.</a:t>
-            </a:r>
-          </a:p>
-          <a:p>
-            <a:r>
-              <a:rPr lang="en-US" dirty="0"/>
-              <a:t>Other questions ask about that person’s employer (e.g.  “Do you think that discussing a mental health disorder with your employer would have negative consequences?”)</a:t>
-            </a:r>
-          </a:p>
-          <a:p>
-            <a:r>
-              <a:rPr lang="en-US" dirty="0"/>
-              <a:t>Some questions can be answered in a free-text format, others are multiple choice.</a:t>
-            </a:r>
-          </a:p>
-        </p:txBody>
-      </p:sp>
+        </p:nvPicPr>
+        <p:blipFill>
+          <a:blip r:embed="rId2"/>
+          <a:stretch>
+            <a:fillRect/>
+          </a:stretch>
+        </p:blipFill>
+        <p:spPr>
+          <a:xfrm>
+            <a:off x="1136156" y="1977932"/>
+            <a:ext cx="7186011" cy="4059274"/>
+          </a:xfrm>
+        </p:spPr>
+      </p:pic>
     </p:spTree>
     <p:extLst>
       <p:ext uri="{BB962C8B-B14F-4D97-AF65-F5344CB8AC3E}">
-        <p14:creationId xmlns:p14="http://schemas.microsoft.com/office/powerpoint/2010/main" val="998581582"/>
+        <p14:creationId xmlns:p14="http://schemas.microsoft.com/office/powerpoint/2010/main" val="1770168347"/>
       </p:ext>
     </p:extLst>
   </p:cSld>
@@ -4527,7 +4886,7 @@
           <p:cNvPr id="2" name="Title 1">
             <a:extLst>
               <a:ext uri="{FF2B5EF4-FFF2-40B4-BE49-F238E27FC236}">
-                <a16:creationId xmlns:a16="http://schemas.microsoft.com/office/drawing/2014/main" id="{0726F1AB-61F0-B74F-9328-1AF008C0CEAC}"/>
+                <a16:creationId xmlns:a16="http://schemas.microsoft.com/office/drawing/2014/main" id="{47C1BD56-7A71-FC40-B3C5-C3859FD8E483}"/>
               </a:ext>
             </a:extLst>
           </p:cNvPr>
@@ -4545,7 +4904,7 @@
           <a:p>
             <a:r>
               <a:rPr lang="en-US" dirty="0"/>
-              <a:t>Limitations and Challenges</a:t>
+              <a:t>OSMI Data</a:t>
             </a:r>
           </a:p>
         </p:txBody>
@@ -4555,7 +4914,7 @@
           <p:cNvPr id="3" name="Content Placeholder 2">
             <a:extLst>
               <a:ext uri="{FF2B5EF4-FFF2-40B4-BE49-F238E27FC236}">
-                <a16:creationId xmlns:a16="http://schemas.microsoft.com/office/drawing/2014/main" id="{D3EB4C40-CD37-C345-933F-7EEF2B77390A}"/>
+                <a16:creationId xmlns:a16="http://schemas.microsoft.com/office/drawing/2014/main" id="{E0CD9789-0FD6-8144-876D-BEC5B95F850E}"/>
               </a:ext>
             </a:extLst>
           </p:cNvPr>
@@ -4566,53 +4925,55 @@
             <p:ph idx="1"/>
           </p:nvPr>
         </p:nvSpPr>
-        <p:spPr>
-          <a:xfrm>
-            <a:off x="1443491" y="2015733"/>
-            <a:ext cx="6571343" cy="3989956"/>
-          </a:xfrm>
-        </p:spPr>
-        <p:txBody>
-          <a:bodyPr>
-            <a:normAutofit/>
-          </a:bodyPr>
-          <a:lstStyle/>
-          <a:p>
-            <a:r>
-              <a:rPr lang="en-US" dirty="0"/>
-              <a:t>Survey is offered in English only</a:t>
-            </a:r>
-          </a:p>
-          <a:p>
-            <a:r>
-              <a:rPr lang="en-US" dirty="0"/>
-              <a:t>No tracking of participation (people could choose to respond multiple times)</a:t>
-            </a:r>
-          </a:p>
-          <a:p>
-            <a:r>
-              <a:rPr lang="en-US" dirty="0"/>
-              <a:t>Free text fields (e.g. gender) need to be consolidated to categorical answers</a:t>
-            </a:r>
-          </a:p>
-          <a:p>
-            <a:r>
-              <a:rPr lang="en-US" dirty="0"/>
-              <a:t>Self-selection / sampling biases exist (predominantly North American, likely engaged / interested in the topic)</a:t>
-            </a:r>
-          </a:p>
-          <a:p>
-            <a:r>
-              <a:rPr lang="en-US" dirty="0"/>
-              <a:t>Information about employer is gathered from employees (may be inaccurate)</a:t>
-            </a:r>
+        <p:spPr/>
+        <p:txBody>
+          <a:bodyPr/>
+          <a:lstStyle/>
+          <a:p>
+            <a:r>
+              <a:rPr lang="en-US" dirty="0"/>
+              <a:t>Open Sourcing Mental Illness (OSMI) offered its mental health survey in 2014, 2016, and 2017.  </a:t>
+            </a:r>
+          </a:p>
+          <a:p>
+            <a:r>
+              <a:rPr lang="en-US" dirty="0"/>
+              <a:t>Data is available for 2014 and 2016.</a:t>
+            </a:r>
+          </a:p>
+          <a:p>
+            <a:r>
+              <a:rPr lang="en-US" dirty="0"/>
+              <a:t>We used 2016 data, licensed under Attribution-</a:t>
+            </a:r>
+            <a:r>
+              <a:rPr lang="en-US" dirty="0" err="1"/>
+              <a:t>ShareAlike</a:t>
+            </a:r>
+            <a:r>
+              <a:rPr lang="en-US" dirty="0"/>
+              <a:t> 4.0 International (CC BY-SA 4.0).  Therefore our findings here are shared under the same license.  For more information please see </a:t>
+            </a:r>
+            <a:r>
+              <a:rPr lang="en-US" dirty="0">
+                <a:hlinkClick r:id="rId2"/>
+              </a:rPr>
+              <a:t>https://creativecommons.org/licenses/by-sa/4.0/</a:t>
+            </a:r>
+            <a:r>
+              <a:rPr lang="en-US" dirty="0"/>
+              <a:t> </a:t>
+            </a:r>
+          </a:p>
+          <a:p>
+            <a:endParaRPr lang="en-US" dirty="0"/>
           </a:p>
         </p:txBody>
       </p:sp>
     </p:spTree>
     <p:extLst>
       <p:ext uri="{BB962C8B-B14F-4D97-AF65-F5344CB8AC3E}">
-        <p14:creationId xmlns:p14="http://schemas.microsoft.com/office/powerpoint/2010/main" val="629127245"/>
+        <p14:creationId xmlns:p14="http://schemas.microsoft.com/office/powerpoint/2010/main" val="2734839023"/>
       </p:ext>
     </p:extLst>
   </p:cSld>
@@ -4644,7 +5005,7 @@
           <p:cNvPr id="2" name="Title 1">
             <a:extLst>
               <a:ext uri="{FF2B5EF4-FFF2-40B4-BE49-F238E27FC236}">
-                <a16:creationId xmlns:a16="http://schemas.microsoft.com/office/drawing/2014/main" id="{12436357-E561-4A43-B321-6A8CA7543CDD}"/>
+                <a16:creationId xmlns:a16="http://schemas.microsoft.com/office/drawing/2014/main" id="{C56753B4-0999-2347-AE36-6FFE12A99312}"/>
               </a:ext>
             </a:extLst>
           </p:cNvPr>
@@ -4662,7 +5023,7 @@
           <a:p>
             <a:r>
               <a:rPr lang="en-US" dirty="0"/>
-              <a:t>Data Cleaning</a:t>
+              <a:t>OSMI Data</a:t>
             </a:r>
           </a:p>
         </p:txBody>
@@ -4672,7 +5033,7 @@
           <p:cNvPr id="3" name="Content Placeholder 2">
             <a:extLst>
               <a:ext uri="{FF2B5EF4-FFF2-40B4-BE49-F238E27FC236}">
-                <a16:creationId xmlns:a16="http://schemas.microsoft.com/office/drawing/2014/main" id="{665401A9-59E2-1948-A0E2-0A83327B168A}"/>
+                <a16:creationId xmlns:a16="http://schemas.microsoft.com/office/drawing/2014/main" id="{12A79409-2B00-6A45-BBEA-0495AF144A73}"/>
               </a:ext>
             </a:extLst>
           </p:cNvPr>
@@ -4685,30 +5046,32 @@
         </p:nvSpPr>
         <p:spPr/>
         <p:txBody>
-          <a:bodyPr/>
-          <a:lstStyle/>
-          <a:p>
-            <a:r>
-              <a:rPr lang="en-US" dirty="0"/>
-              <a:t>Notes field mined for useful information that could clear up ambiguous answers</a:t>
-            </a:r>
-          </a:p>
-          <a:p>
-            <a:r>
-              <a:rPr lang="en-US" dirty="0"/>
-              <a:t>Gender field consolidated into M/F/Other</a:t>
-            </a:r>
-          </a:p>
-          <a:p>
-            <a:r>
-              <a:rPr lang="en-US" dirty="0"/>
-              <a:t>Removal of unhelpful questions like U.S. State</a:t>
-            </a:r>
-          </a:p>
-          <a:p>
-            <a:r>
-              <a:rPr lang="en-US" dirty="0"/>
-              <a:t>?</a:t>
+          <a:bodyPr>
+            <a:normAutofit fontScale="92500" lnSpcReduction="20000"/>
+          </a:bodyPr>
+          <a:lstStyle/>
+          <a:p>
+            <a:r>
+              <a:rPr lang="en-US" dirty="0"/>
+              <a:t>Survey data is collected anonymously, with no identifying information (no IRB / Ethics oversight required).</a:t>
+            </a:r>
+          </a:p>
+          <a:p>
+            <a:r>
+              <a:rPr lang="en-US" dirty="0"/>
+              <a:t>Some questions are posed about the person answering the survey, such as “What is your gender?”, “Do you work remotely?”, “Do you have a family history of mental illness?”.</a:t>
+            </a:r>
+          </a:p>
+          <a:p>
+            <a:r>
+              <a:rPr lang="en-US" dirty="0"/>
+              <a:t>Other questions ask about that person’s employer (e.g.  “Do you think that discussing a mental health disorder with your employer would have negative consequences?”)</a:t>
+            </a:r>
+          </a:p>
+          <a:p>
+            <a:r>
+              <a:rPr lang="en-US" dirty="0"/>
+              <a:t>Some questions can be answered in a free-text format, others are multiple choice.</a:t>
             </a:r>
           </a:p>
         </p:txBody>
@@ -4716,7 +5079,7 @@
     </p:spTree>
     <p:extLst>
       <p:ext uri="{BB962C8B-B14F-4D97-AF65-F5344CB8AC3E}">
-        <p14:creationId xmlns:p14="http://schemas.microsoft.com/office/powerpoint/2010/main" val="1336197372"/>
+        <p14:creationId xmlns:p14="http://schemas.microsoft.com/office/powerpoint/2010/main" val="998581582"/>
       </p:ext>
     </p:extLst>
   </p:cSld>
@@ -4748,7 +5111,7 @@
           <p:cNvPr id="2" name="Title 1">
             <a:extLst>
               <a:ext uri="{FF2B5EF4-FFF2-40B4-BE49-F238E27FC236}">
-                <a16:creationId xmlns:a16="http://schemas.microsoft.com/office/drawing/2014/main" id="{63258A90-013C-7741-90B5-D4AA7821165F}"/>
+                <a16:creationId xmlns:a16="http://schemas.microsoft.com/office/drawing/2014/main" id="{0726F1AB-61F0-B74F-9328-1AF008C0CEAC}"/>
               </a:ext>
             </a:extLst>
           </p:cNvPr>
@@ -4766,7 +5129,7 @@
           <a:p>
             <a:r>
               <a:rPr lang="en-US" dirty="0"/>
-              <a:t>Analytics Approach</a:t>
+              <a:t>Limitations and Challenges</a:t>
             </a:r>
           </a:p>
         </p:txBody>
@@ -4776,7 +5139,7 @@
           <p:cNvPr id="3" name="Content Placeholder 2">
             <a:extLst>
               <a:ext uri="{FF2B5EF4-FFF2-40B4-BE49-F238E27FC236}">
-                <a16:creationId xmlns:a16="http://schemas.microsoft.com/office/drawing/2014/main" id="{6ED31153-0D20-C944-8956-664E5E59D495}"/>
+                <a16:creationId xmlns:a16="http://schemas.microsoft.com/office/drawing/2014/main" id="{D3EB4C40-CD37-C345-933F-7EEF2B77390A}"/>
               </a:ext>
             </a:extLst>
           </p:cNvPr>
@@ -4787,37 +5150,53 @@
             <p:ph idx="1"/>
           </p:nvPr>
         </p:nvSpPr>
-        <p:spPr/>
-        <p:txBody>
-          <a:bodyPr/>
-          <a:lstStyle/>
-          <a:p>
-            <a:r>
-              <a:rPr lang="en-US" dirty="0"/>
-              <a:t>Aim: model seeking professional mental health services as the dependent variable based on responses to other questions</a:t>
-            </a:r>
-          </a:p>
-          <a:p>
-            <a:r>
-              <a:rPr lang="en-US" dirty="0"/>
-              <a:t>Logistic regression using logit</a:t>
-            </a:r>
-          </a:p>
-          <a:p>
-            <a:r>
-              <a:rPr lang="en-US" dirty="0"/>
-              <a:t>???</a:t>
-            </a:r>
-          </a:p>
-          <a:p>
-            <a:endParaRPr lang="en-US" dirty="0"/>
+        <p:spPr>
+          <a:xfrm>
+            <a:off x="1443491" y="2015733"/>
+            <a:ext cx="6571343" cy="3989956"/>
+          </a:xfrm>
+        </p:spPr>
+        <p:txBody>
+          <a:bodyPr>
+            <a:normAutofit/>
+          </a:bodyPr>
+          <a:lstStyle/>
+          <a:p>
+            <a:r>
+              <a:rPr lang="en-US" dirty="0"/>
+              <a:t>Survey is offered in English only</a:t>
+            </a:r>
+          </a:p>
+          <a:p>
+            <a:r>
+              <a:rPr lang="en-US" dirty="0"/>
+              <a:t>No tracking of participation (people could choose to respond multiple times)</a:t>
+            </a:r>
+          </a:p>
+          <a:p>
+            <a:r>
+              <a:rPr lang="en-US" dirty="0"/>
+              <a:t>Free text fields (e.g. gender) need to be consolidated to categorical answers</a:t>
+            </a:r>
+          </a:p>
+          <a:p>
+            <a:r>
+              <a:rPr lang="en-US" dirty="0"/>
+              <a:t>Self-selection / sampling biases exist (predominantly North American, likely engaged / interested in the topic)</a:t>
+            </a:r>
+          </a:p>
+          <a:p>
+            <a:r>
+              <a:rPr lang="en-US" dirty="0"/>
+              <a:t>Information about employer is gathered from employees (may be inaccurate)</a:t>
+            </a:r>
           </a:p>
         </p:txBody>
       </p:sp>
     </p:spTree>
     <p:extLst>
       <p:ext uri="{BB962C8B-B14F-4D97-AF65-F5344CB8AC3E}">
-        <p14:creationId xmlns:p14="http://schemas.microsoft.com/office/powerpoint/2010/main" val="378776476"/>
+        <p14:creationId xmlns:p14="http://schemas.microsoft.com/office/powerpoint/2010/main" val="629127245"/>
       </p:ext>
     </p:extLst>
   </p:cSld>

</xml_diff>